<commit_message>
Updated slides for agile ml
</commit_message>
<xml_diff>
--- a/agile-ml/slides/agile-machine-learning.pptx
+++ b/agile-ml/slides/agile-machine-learning.pptx
@@ -1145,7 +1145,7 @@
           <a:p>
             <a:fld id="{CA4377EA-96C4-4E39-9E7B-46D422E9DF1E}" type="datetimeFigureOut">
               <a:rPr lang="en-US" smtClean="0"/>
-              <a:t>6/9/2016</a:t>
+              <a:t>11/15/2016</a:t>
             </a:fld>
             <a:endParaRPr lang="en-US"/>
           </a:p>
@@ -1877,7 +1877,7 @@
           <a:p>
             <a:fld id="{0DB13098-8CF7-4674-A542-5FC8F9E5496B}" type="datetimeFigureOut">
               <a:rPr lang="en-US" smtClean="0"/>
-              <a:t>6/9/2016</a:t>
+              <a:t>11/15/2016</a:t>
             </a:fld>
             <a:endParaRPr lang="en-US"/>
           </a:p>
@@ -2045,7 +2045,7 @@
           <a:p>
             <a:fld id="{0DB13098-8CF7-4674-A542-5FC8F9E5496B}" type="datetimeFigureOut">
               <a:rPr lang="en-US" smtClean="0"/>
-              <a:t>6/9/2016</a:t>
+              <a:t>11/15/2016</a:t>
             </a:fld>
             <a:endParaRPr lang="en-US"/>
           </a:p>
@@ -2223,7 +2223,7 @@
           <a:p>
             <a:fld id="{0DB13098-8CF7-4674-A542-5FC8F9E5496B}" type="datetimeFigureOut">
               <a:rPr lang="en-US" smtClean="0"/>
-              <a:t>6/9/2016</a:t>
+              <a:t>11/15/2016</a:t>
             </a:fld>
             <a:endParaRPr lang="en-US"/>
           </a:p>
@@ -2391,7 +2391,7 @@
           <a:p>
             <a:fld id="{0DB13098-8CF7-4674-A542-5FC8F9E5496B}" type="datetimeFigureOut">
               <a:rPr lang="en-US" smtClean="0"/>
-              <a:t>6/9/2016</a:t>
+              <a:t>11/15/2016</a:t>
             </a:fld>
             <a:endParaRPr lang="en-US"/>
           </a:p>
@@ -2636,7 +2636,7 @@
           <a:p>
             <a:fld id="{0DB13098-8CF7-4674-A542-5FC8F9E5496B}" type="datetimeFigureOut">
               <a:rPr lang="en-US" smtClean="0"/>
-              <a:t>6/9/2016</a:t>
+              <a:t>11/15/2016</a:t>
             </a:fld>
             <a:endParaRPr lang="en-US"/>
           </a:p>
@@ -2865,7 +2865,7 @@
           <a:p>
             <a:fld id="{0DB13098-8CF7-4674-A542-5FC8F9E5496B}" type="datetimeFigureOut">
               <a:rPr lang="en-US" smtClean="0"/>
-              <a:t>6/9/2016</a:t>
+              <a:t>11/15/2016</a:t>
             </a:fld>
             <a:endParaRPr lang="en-US"/>
           </a:p>
@@ -3229,7 +3229,7 @@
           <a:p>
             <a:fld id="{0DB13098-8CF7-4674-A542-5FC8F9E5496B}" type="datetimeFigureOut">
               <a:rPr lang="en-US" smtClean="0"/>
-              <a:t>6/9/2016</a:t>
+              <a:t>11/15/2016</a:t>
             </a:fld>
             <a:endParaRPr lang="en-US"/>
           </a:p>
@@ -3346,7 +3346,7 @@
           <a:p>
             <a:fld id="{0DB13098-8CF7-4674-A542-5FC8F9E5496B}" type="datetimeFigureOut">
               <a:rPr lang="en-US" smtClean="0"/>
-              <a:t>6/9/2016</a:t>
+              <a:t>11/15/2016</a:t>
             </a:fld>
             <a:endParaRPr lang="en-US"/>
           </a:p>
@@ -3441,7 +3441,7 @@
           <a:p>
             <a:fld id="{0DB13098-8CF7-4674-A542-5FC8F9E5496B}" type="datetimeFigureOut">
               <a:rPr lang="en-US" smtClean="0"/>
-              <a:t>6/9/2016</a:t>
+              <a:t>11/15/2016</a:t>
             </a:fld>
             <a:endParaRPr lang="en-US"/>
           </a:p>
@@ -3716,7 +3716,7 @@
           <a:p>
             <a:fld id="{0DB13098-8CF7-4674-A542-5FC8F9E5496B}" type="datetimeFigureOut">
               <a:rPr lang="en-US" smtClean="0"/>
-              <a:t>6/9/2016</a:t>
+              <a:t>11/15/2016</a:t>
             </a:fld>
             <a:endParaRPr lang="en-US"/>
           </a:p>
@@ -3968,7 +3968,7 @@
           <a:p>
             <a:fld id="{0DB13098-8CF7-4674-A542-5FC8F9E5496B}" type="datetimeFigureOut">
               <a:rPr lang="en-US" smtClean="0"/>
-              <a:t>6/9/2016</a:t>
+              <a:t>11/15/2016</a:t>
             </a:fld>
             <a:endParaRPr lang="en-US"/>
           </a:p>
@@ -4181,7 +4181,7 @@
             <a:fld id="{0DB13098-8CF7-4674-A542-5FC8F9E5496B}" type="datetimeFigureOut">
               <a:rPr lang="en-US" smtClean="0"/>
               <a:pPr/>
-              <a:t>6/9/2016</a:t>
+              <a:t>11/15/2016</a:t>
             </a:fld>
             <a:endParaRPr lang="en-US"/>
           </a:p>
@@ -6067,7 +6067,7 @@
           <a:p>
             <a:r>
               <a:rPr lang="en-US" dirty="0"/>
-              <a:t>Based in SF</a:t>
+              <a:t>Based in San Francisco</a:t>
             </a:r>
           </a:p>
           <a:p>
@@ -12579,56 +12579,67 @@
       </p:grpSpPr>
       <p:sp>
         <p:nvSpPr>
-          <p:cNvPr id="4" name="Rectangle 3"/>
-          <p:cNvSpPr/>
-          <p:nvPr/>
-        </p:nvSpPr>
-        <p:spPr>
-          <a:xfrm>
-            <a:off x="2118789" y="3244334"/>
-            <a:ext cx="7954422" cy="1323439"/>
-          </a:xfrm>
-          <a:prstGeom prst="rect">
-            <a:avLst/>
-          </a:prstGeom>
-        </p:spPr>
-        <p:txBody>
-          <a:bodyPr wrap="none">
-            <a:spAutoFit/>
-          </a:bodyPr>
-          <a:lstStyle/>
-          <a:p>
-            <a:pPr algn="ctr"/>
-            <a:r>
-              <a:rPr lang="en-US" sz="4000" i="1" dirty="0">
-                <a:latin typeface="Libre Baskerville" panose="02000000000000000000" pitchFamily="2" charset="0"/>
-              </a:rPr>
-              <a:t>Repository on GitHub: </a:t>
-            </a:r>
-          </a:p>
-          <a:p>
-            <a:pPr algn="ctr"/>
-            <a:r>
-              <a:rPr lang="en-US" sz="4000" i="1" dirty="0" err="1">
-                <a:latin typeface="Libre Baskerville" panose="02000000000000000000" pitchFamily="2" charset="0"/>
-              </a:rPr>
-              <a:t>JamesDixon</a:t>
-            </a:r>
-            <a:r>
-              <a:rPr lang="en-US" sz="4000" i="1" dirty="0">
-                <a:latin typeface="Libre Baskerville" panose="02000000000000000000" pitchFamily="2" charset="0"/>
-              </a:rPr>
+          <p:cNvPr id="5" name="Title 4"/>
+          <p:cNvSpPr>
+            <a:spLocks noGrp="1"/>
+          </p:cNvSpPr>
+          <p:nvPr>
+            <p:ph type="title"/>
+          </p:nvPr>
+        </p:nvSpPr>
+        <p:spPr/>
+        <p:txBody>
+          <a:bodyPr/>
+          <a:lstStyle/>
+          <a:p>
+            <a:r>
+              <a:rPr lang="en-US" dirty="0"/>
+              <a:t>Code on GitHub</a:t>
+            </a:r>
+          </a:p>
+        </p:txBody>
+      </p:sp>
+      <p:sp>
+        <p:nvSpPr>
+          <p:cNvPr id="6" name="Content Placeholder 5"/>
+          <p:cNvSpPr>
+            <a:spLocks noGrp="1"/>
+          </p:cNvSpPr>
+          <p:nvPr>
+            <p:ph idx="1"/>
+          </p:nvPr>
+        </p:nvSpPr>
+        <p:spPr/>
+        <p:txBody>
+          <a:bodyPr/>
+          <a:lstStyle/>
+          <a:p>
+            <a:r>
+              <a:rPr lang="en-US" i="1" dirty="0" err="1"/>
+              <a:t>JamesSDixon</a:t>
+            </a:r>
+            <a:r>
+              <a:rPr lang="en-US" i="1" dirty="0"/>
               <a:t>/</a:t>
             </a:r>
             <a:r>
-              <a:rPr lang="en-US" sz="4000" i="1" dirty="0" err="1">
-                <a:latin typeface="Libre Baskerville" panose="02000000000000000000" pitchFamily="2" charset="0"/>
-              </a:rPr>
+              <a:rPr lang="en-US" i="1" dirty="0" err="1"/>
               <a:t>Kaggle.HomeDepot</a:t>
             </a:r>
-            <a:endParaRPr lang="en-US" sz="4000" i="1" dirty="0">
-              <a:latin typeface="Libre Baskerville" panose="02000000000000000000" pitchFamily="2" charset="0"/>
-            </a:endParaRPr>
+            <a:endParaRPr lang="en-US" i="1" dirty="0"/>
+          </a:p>
+          <a:p>
+            <a:r>
+              <a:rPr lang="en-US" i="1" dirty="0" err="1"/>
+              <a:t>mathias-brandewinder</a:t>
+            </a:r>
+            <a:r>
+              <a:rPr lang="en-US" i="1" dirty="0"/>
+              <a:t>/Presentations</a:t>
+            </a:r>
+          </a:p>
+          <a:p>
+            <a:endParaRPr lang="en-US" dirty="0"/>
           </a:p>
         </p:txBody>
       </p:sp>
@@ -15628,7 +15639,7 @@
             </a:r>
             <a:r>
               <a:rPr lang="en-US" i="1" dirty="0" err="1"/>
-              <a:t>JamesDixon</a:t>
+              <a:t>JamesSDixon</a:t>
             </a:r>
             <a:r>
               <a:rPr lang="en-US" i="1" dirty="0"/>

</xml_diff>